<commit_message>
2015-01-13 poles and finished lec1 notebook
</commit_message>
<xml_diff>
--- a/CSE10101.pptx
+++ b/CSE10101.pptx
@@ -226,7 +226,7 @@
           <a:p>
             <a:fld id="{D5BBA8B7-AD38-1148-82AE-49A35A4F78E6}" type="datetimeFigureOut">
               <a:rPr lang="en-US" smtClean="0"/>
-              <a:t>1/9/15</a:t>
+              <a:t>1/13/15</a:t>
             </a:fld>
             <a:endParaRPr lang="en-US"/>
           </a:p>
@@ -1922,6 +1922,426 @@
 </p:notes>
 </file>
 
+<file path=ppt/notesSlides/notesSlide25.xml><?xml version="1.0" encoding="utf-8"?>
+<p:notes xmlns:a="http://schemas.openxmlformats.org/drawingml/2006/main" xmlns:r="http://schemas.openxmlformats.org/officeDocument/2006/relationships" xmlns:p="http://schemas.openxmlformats.org/presentationml/2006/main">
+  <p:cSld>
+    <p:spTree>
+      <p:nvGrpSpPr>
+        <p:cNvPr id="1" name=""/>
+        <p:cNvGrpSpPr/>
+        <p:nvPr/>
+      </p:nvGrpSpPr>
+      <p:grpSpPr>
+        <a:xfrm>
+          <a:off x="0" y="0"/>
+          <a:ext cx="0" cy="0"/>
+          <a:chOff x="0" y="0"/>
+          <a:chExt cx="0" cy="0"/>
+        </a:xfrm>
+      </p:grpSpPr>
+      <p:sp>
+        <p:nvSpPr>
+          <p:cNvPr id="2" name="Slide Image Placeholder 1"/>
+          <p:cNvSpPr>
+            <a:spLocks noGrp="1" noRot="1" noChangeAspect="1"/>
+          </p:cNvSpPr>
+          <p:nvPr>
+            <p:ph type="sldImg"/>
+          </p:nvPr>
+        </p:nvSpPr>
+        <p:spPr/>
+      </p:sp>
+      <p:sp>
+        <p:nvSpPr>
+          <p:cNvPr id="3" name="Notes Placeholder 2"/>
+          <p:cNvSpPr>
+            <a:spLocks noGrp="1"/>
+          </p:cNvSpPr>
+          <p:nvPr>
+            <p:ph type="body" idx="1"/>
+          </p:nvPr>
+        </p:nvSpPr>
+        <p:spPr/>
+        <p:txBody>
+          <a:bodyPr/>
+          <a:lstStyle/>
+          <a:p>
+            <a:endParaRPr lang="en-US"/>
+          </a:p>
+        </p:txBody>
+      </p:sp>
+      <p:sp>
+        <p:nvSpPr>
+          <p:cNvPr id="4" name="Slide Number Placeholder 3"/>
+          <p:cNvSpPr>
+            <a:spLocks noGrp="1"/>
+          </p:cNvSpPr>
+          <p:nvPr>
+            <p:ph type="sldNum" sz="quarter" idx="10"/>
+          </p:nvPr>
+        </p:nvSpPr>
+        <p:spPr/>
+        <p:txBody>
+          <a:bodyPr/>
+          <a:lstStyle/>
+          <a:p>
+            <a:fld id="{A4F71BA7-982C-5744-B28F-8EF9F6462FED}" type="slidenum">
+              <a:rPr lang="en-US" smtClean="0"/>
+              <a:t>25</a:t>
+            </a:fld>
+            <a:endParaRPr lang="en-US"/>
+          </a:p>
+        </p:txBody>
+      </p:sp>
+    </p:spTree>
+    <p:extLst>
+      <p:ext uri="{BB962C8B-B14F-4D97-AF65-F5344CB8AC3E}">
+        <p14:creationId xmlns:p14="http://schemas.microsoft.com/office/powerpoint/2010/main" val="243708688"/>
+      </p:ext>
+    </p:extLst>
+  </p:cSld>
+  <p:clrMapOvr>
+    <a:masterClrMapping/>
+  </p:clrMapOvr>
+</p:notes>
+</file>
+
+<file path=ppt/notesSlides/notesSlide26.xml><?xml version="1.0" encoding="utf-8"?>
+<p:notes xmlns:a="http://schemas.openxmlformats.org/drawingml/2006/main" xmlns:r="http://schemas.openxmlformats.org/officeDocument/2006/relationships" xmlns:p="http://schemas.openxmlformats.org/presentationml/2006/main">
+  <p:cSld>
+    <p:spTree>
+      <p:nvGrpSpPr>
+        <p:cNvPr id="1" name=""/>
+        <p:cNvGrpSpPr/>
+        <p:nvPr/>
+      </p:nvGrpSpPr>
+      <p:grpSpPr>
+        <a:xfrm>
+          <a:off x="0" y="0"/>
+          <a:ext cx="0" cy="0"/>
+          <a:chOff x="0" y="0"/>
+          <a:chExt cx="0" cy="0"/>
+        </a:xfrm>
+      </p:grpSpPr>
+      <p:sp>
+        <p:nvSpPr>
+          <p:cNvPr id="2" name="Slide Image Placeholder 1"/>
+          <p:cNvSpPr>
+            <a:spLocks noGrp="1" noRot="1" noChangeAspect="1"/>
+          </p:cNvSpPr>
+          <p:nvPr>
+            <p:ph type="sldImg"/>
+          </p:nvPr>
+        </p:nvSpPr>
+        <p:spPr/>
+      </p:sp>
+      <p:sp>
+        <p:nvSpPr>
+          <p:cNvPr id="3" name="Notes Placeholder 2"/>
+          <p:cNvSpPr>
+            <a:spLocks noGrp="1"/>
+          </p:cNvSpPr>
+          <p:nvPr>
+            <p:ph type="body" idx="1"/>
+          </p:nvPr>
+        </p:nvSpPr>
+        <p:spPr/>
+        <p:txBody>
+          <a:bodyPr/>
+          <a:lstStyle/>
+          <a:p>
+            <a:endParaRPr lang="en-US"/>
+          </a:p>
+        </p:txBody>
+      </p:sp>
+      <p:sp>
+        <p:nvSpPr>
+          <p:cNvPr id="4" name="Slide Number Placeholder 3"/>
+          <p:cNvSpPr>
+            <a:spLocks noGrp="1"/>
+          </p:cNvSpPr>
+          <p:nvPr>
+            <p:ph type="sldNum" sz="quarter" idx="10"/>
+          </p:nvPr>
+        </p:nvSpPr>
+        <p:spPr/>
+        <p:txBody>
+          <a:bodyPr/>
+          <a:lstStyle/>
+          <a:p>
+            <a:fld id="{A4F71BA7-982C-5744-B28F-8EF9F6462FED}" type="slidenum">
+              <a:rPr lang="en-US" smtClean="0"/>
+              <a:t>26</a:t>
+            </a:fld>
+            <a:endParaRPr lang="en-US"/>
+          </a:p>
+        </p:txBody>
+      </p:sp>
+    </p:spTree>
+    <p:extLst>
+      <p:ext uri="{BB962C8B-B14F-4D97-AF65-F5344CB8AC3E}">
+        <p14:creationId xmlns:p14="http://schemas.microsoft.com/office/powerpoint/2010/main" val="3435633649"/>
+      </p:ext>
+    </p:extLst>
+  </p:cSld>
+  <p:clrMapOvr>
+    <a:masterClrMapping/>
+  </p:clrMapOvr>
+</p:notes>
+</file>
+
+<file path=ppt/notesSlides/notesSlide27.xml><?xml version="1.0" encoding="utf-8"?>
+<p:notes xmlns:a="http://schemas.openxmlformats.org/drawingml/2006/main" xmlns:r="http://schemas.openxmlformats.org/officeDocument/2006/relationships" xmlns:p="http://schemas.openxmlformats.org/presentationml/2006/main">
+  <p:cSld>
+    <p:spTree>
+      <p:nvGrpSpPr>
+        <p:cNvPr id="1" name=""/>
+        <p:cNvGrpSpPr/>
+        <p:nvPr/>
+      </p:nvGrpSpPr>
+      <p:grpSpPr>
+        <a:xfrm>
+          <a:off x="0" y="0"/>
+          <a:ext cx="0" cy="0"/>
+          <a:chOff x="0" y="0"/>
+          <a:chExt cx="0" cy="0"/>
+        </a:xfrm>
+      </p:grpSpPr>
+      <p:sp>
+        <p:nvSpPr>
+          <p:cNvPr id="2" name="Slide Image Placeholder 1"/>
+          <p:cNvSpPr>
+            <a:spLocks noGrp="1" noRot="1" noChangeAspect="1"/>
+          </p:cNvSpPr>
+          <p:nvPr>
+            <p:ph type="sldImg"/>
+          </p:nvPr>
+        </p:nvSpPr>
+        <p:spPr/>
+      </p:sp>
+      <p:sp>
+        <p:nvSpPr>
+          <p:cNvPr id="3" name="Notes Placeholder 2"/>
+          <p:cNvSpPr>
+            <a:spLocks noGrp="1"/>
+          </p:cNvSpPr>
+          <p:nvPr>
+            <p:ph type="body" idx="1"/>
+          </p:nvPr>
+        </p:nvSpPr>
+        <p:spPr/>
+        <p:txBody>
+          <a:bodyPr/>
+          <a:lstStyle/>
+          <a:p>
+            <a:endParaRPr lang="en-US"/>
+          </a:p>
+        </p:txBody>
+      </p:sp>
+      <p:sp>
+        <p:nvSpPr>
+          <p:cNvPr id="4" name="Slide Number Placeholder 3"/>
+          <p:cNvSpPr>
+            <a:spLocks noGrp="1"/>
+          </p:cNvSpPr>
+          <p:nvPr>
+            <p:ph type="sldNum" sz="quarter" idx="10"/>
+          </p:nvPr>
+        </p:nvSpPr>
+        <p:spPr/>
+        <p:txBody>
+          <a:bodyPr/>
+          <a:lstStyle/>
+          <a:p>
+            <a:fld id="{A4F71BA7-982C-5744-B28F-8EF9F6462FED}" type="slidenum">
+              <a:rPr lang="en-US" smtClean="0"/>
+              <a:t>27</a:t>
+            </a:fld>
+            <a:endParaRPr lang="en-US"/>
+          </a:p>
+        </p:txBody>
+      </p:sp>
+    </p:spTree>
+    <p:extLst>
+      <p:ext uri="{BB962C8B-B14F-4D97-AF65-F5344CB8AC3E}">
+        <p14:creationId xmlns:p14="http://schemas.microsoft.com/office/powerpoint/2010/main" val="2635108724"/>
+      </p:ext>
+    </p:extLst>
+  </p:cSld>
+  <p:clrMapOvr>
+    <a:masterClrMapping/>
+  </p:clrMapOvr>
+</p:notes>
+</file>
+
+<file path=ppt/notesSlides/notesSlide28.xml><?xml version="1.0" encoding="utf-8"?>
+<p:notes xmlns:a="http://schemas.openxmlformats.org/drawingml/2006/main" xmlns:r="http://schemas.openxmlformats.org/officeDocument/2006/relationships" xmlns:p="http://schemas.openxmlformats.org/presentationml/2006/main">
+  <p:cSld>
+    <p:spTree>
+      <p:nvGrpSpPr>
+        <p:cNvPr id="1" name=""/>
+        <p:cNvGrpSpPr/>
+        <p:nvPr/>
+      </p:nvGrpSpPr>
+      <p:grpSpPr>
+        <a:xfrm>
+          <a:off x="0" y="0"/>
+          <a:ext cx="0" cy="0"/>
+          <a:chOff x="0" y="0"/>
+          <a:chExt cx="0" cy="0"/>
+        </a:xfrm>
+      </p:grpSpPr>
+      <p:sp>
+        <p:nvSpPr>
+          <p:cNvPr id="2" name="Slide Image Placeholder 1"/>
+          <p:cNvSpPr>
+            <a:spLocks noGrp="1" noRot="1" noChangeAspect="1"/>
+          </p:cNvSpPr>
+          <p:nvPr>
+            <p:ph type="sldImg"/>
+          </p:nvPr>
+        </p:nvSpPr>
+        <p:spPr/>
+      </p:sp>
+      <p:sp>
+        <p:nvSpPr>
+          <p:cNvPr id="3" name="Notes Placeholder 2"/>
+          <p:cNvSpPr>
+            <a:spLocks noGrp="1"/>
+          </p:cNvSpPr>
+          <p:nvPr>
+            <p:ph type="body" idx="1"/>
+          </p:nvPr>
+        </p:nvSpPr>
+        <p:spPr/>
+        <p:txBody>
+          <a:bodyPr/>
+          <a:lstStyle/>
+          <a:p>
+            <a:endParaRPr lang="en-US"/>
+          </a:p>
+        </p:txBody>
+      </p:sp>
+      <p:sp>
+        <p:nvSpPr>
+          <p:cNvPr id="4" name="Slide Number Placeholder 3"/>
+          <p:cNvSpPr>
+            <a:spLocks noGrp="1"/>
+          </p:cNvSpPr>
+          <p:nvPr>
+            <p:ph type="sldNum" sz="quarter" idx="10"/>
+          </p:nvPr>
+        </p:nvSpPr>
+        <p:spPr/>
+        <p:txBody>
+          <a:bodyPr/>
+          <a:lstStyle/>
+          <a:p>
+            <a:fld id="{A4F71BA7-982C-5744-B28F-8EF9F6462FED}" type="slidenum">
+              <a:rPr lang="en-US" smtClean="0"/>
+              <a:t>28</a:t>
+            </a:fld>
+            <a:endParaRPr lang="en-US"/>
+          </a:p>
+        </p:txBody>
+      </p:sp>
+    </p:spTree>
+    <p:extLst>
+      <p:ext uri="{BB962C8B-B14F-4D97-AF65-F5344CB8AC3E}">
+        <p14:creationId xmlns:p14="http://schemas.microsoft.com/office/powerpoint/2010/main" val="3369639842"/>
+      </p:ext>
+    </p:extLst>
+  </p:cSld>
+  <p:clrMapOvr>
+    <a:masterClrMapping/>
+  </p:clrMapOvr>
+</p:notes>
+</file>
+
+<file path=ppt/notesSlides/notesSlide29.xml><?xml version="1.0" encoding="utf-8"?>
+<p:notes xmlns:a="http://schemas.openxmlformats.org/drawingml/2006/main" xmlns:r="http://schemas.openxmlformats.org/officeDocument/2006/relationships" xmlns:p="http://schemas.openxmlformats.org/presentationml/2006/main">
+  <p:cSld>
+    <p:spTree>
+      <p:nvGrpSpPr>
+        <p:cNvPr id="1" name=""/>
+        <p:cNvGrpSpPr/>
+        <p:nvPr/>
+      </p:nvGrpSpPr>
+      <p:grpSpPr>
+        <a:xfrm>
+          <a:off x="0" y="0"/>
+          <a:ext cx="0" cy="0"/>
+          <a:chOff x="0" y="0"/>
+          <a:chExt cx="0" cy="0"/>
+        </a:xfrm>
+      </p:grpSpPr>
+      <p:sp>
+        <p:nvSpPr>
+          <p:cNvPr id="2" name="Slide Image Placeholder 1"/>
+          <p:cNvSpPr>
+            <a:spLocks noGrp="1" noRot="1" noChangeAspect="1"/>
+          </p:cNvSpPr>
+          <p:nvPr>
+            <p:ph type="sldImg"/>
+          </p:nvPr>
+        </p:nvSpPr>
+        <p:spPr/>
+      </p:sp>
+      <p:sp>
+        <p:nvSpPr>
+          <p:cNvPr id="3" name="Notes Placeholder 2"/>
+          <p:cNvSpPr>
+            <a:spLocks noGrp="1"/>
+          </p:cNvSpPr>
+          <p:nvPr>
+            <p:ph type="body" idx="1"/>
+          </p:nvPr>
+        </p:nvSpPr>
+        <p:spPr/>
+        <p:txBody>
+          <a:bodyPr/>
+          <a:lstStyle/>
+          <a:p>
+            <a:endParaRPr lang="en-US"/>
+          </a:p>
+        </p:txBody>
+      </p:sp>
+      <p:sp>
+        <p:nvSpPr>
+          <p:cNvPr id="4" name="Slide Number Placeholder 3"/>
+          <p:cNvSpPr>
+            <a:spLocks noGrp="1"/>
+          </p:cNvSpPr>
+          <p:nvPr>
+            <p:ph type="sldNum" sz="quarter" idx="10"/>
+          </p:nvPr>
+        </p:nvSpPr>
+        <p:spPr/>
+        <p:txBody>
+          <a:bodyPr/>
+          <a:lstStyle/>
+          <a:p>
+            <a:fld id="{A4F71BA7-982C-5744-B28F-8EF9F6462FED}" type="slidenum">
+              <a:rPr lang="en-US" smtClean="0"/>
+              <a:t>29</a:t>
+            </a:fld>
+            <a:endParaRPr lang="en-US"/>
+          </a:p>
+        </p:txBody>
+      </p:sp>
+    </p:spTree>
+    <p:extLst>
+      <p:ext uri="{BB962C8B-B14F-4D97-AF65-F5344CB8AC3E}">
+        <p14:creationId xmlns:p14="http://schemas.microsoft.com/office/powerpoint/2010/main" val="1939921210"/>
+      </p:ext>
+    </p:extLst>
+  </p:cSld>
+  <p:clrMapOvr>
+    <a:masterClrMapping/>
+  </p:clrMapOvr>
+</p:notes>
+</file>
+
 <file path=ppt/notesSlides/notesSlide3.xml><?xml version="1.0" encoding="utf-8"?>
 <p:notes xmlns:a="http://schemas.openxmlformats.org/drawingml/2006/main" xmlns:r="http://schemas.openxmlformats.org/officeDocument/2006/relationships" xmlns:p="http://schemas.openxmlformats.org/presentationml/2006/main">
   <p:cSld>
@@ -1997,6 +2417,510 @@
     <p:extLst>
       <p:ext uri="{BB962C8B-B14F-4D97-AF65-F5344CB8AC3E}">
         <p14:creationId xmlns:p14="http://schemas.microsoft.com/office/powerpoint/2010/main" val="3831115879"/>
+      </p:ext>
+    </p:extLst>
+  </p:cSld>
+  <p:clrMapOvr>
+    <a:masterClrMapping/>
+  </p:clrMapOvr>
+</p:notes>
+</file>
+
+<file path=ppt/notesSlides/notesSlide30.xml><?xml version="1.0" encoding="utf-8"?>
+<p:notes xmlns:a="http://schemas.openxmlformats.org/drawingml/2006/main" xmlns:r="http://schemas.openxmlformats.org/officeDocument/2006/relationships" xmlns:p="http://schemas.openxmlformats.org/presentationml/2006/main">
+  <p:cSld>
+    <p:spTree>
+      <p:nvGrpSpPr>
+        <p:cNvPr id="1" name=""/>
+        <p:cNvGrpSpPr/>
+        <p:nvPr/>
+      </p:nvGrpSpPr>
+      <p:grpSpPr>
+        <a:xfrm>
+          <a:off x="0" y="0"/>
+          <a:ext cx="0" cy="0"/>
+          <a:chOff x="0" y="0"/>
+          <a:chExt cx="0" cy="0"/>
+        </a:xfrm>
+      </p:grpSpPr>
+      <p:sp>
+        <p:nvSpPr>
+          <p:cNvPr id="2" name="Slide Image Placeholder 1"/>
+          <p:cNvSpPr>
+            <a:spLocks noGrp="1" noRot="1" noChangeAspect="1"/>
+          </p:cNvSpPr>
+          <p:nvPr>
+            <p:ph type="sldImg"/>
+          </p:nvPr>
+        </p:nvSpPr>
+        <p:spPr/>
+      </p:sp>
+      <p:sp>
+        <p:nvSpPr>
+          <p:cNvPr id="3" name="Notes Placeholder 2"/>
+          <p:cNvSpPr>
+            <a:spLocks noGrp="1"/>
+          </p:cNvSpPr>
+          <p:nvPr>
+            <p:ph type="body" idx="1"/>
+          </p:nvPr>
+        </p:nvSpPr>
+        <p:spPr/>
+        <p:txBody>
+          <a:bodyPr/>
+          <a:lstStyle/>
+          <a:p>
+            <a:endParaRPr lang="en-US"/>
+          </a:p>
+        </p:txBody>
+      </p:sp>
+      <p:sp>
+        <p:nvSpPr>
+          <p:cNvPr id="4" name="Slide Number Placeholder 3"/>
+          <p:cNvSpPr>
+            <a:spLocks noGrp="1"/>
+          </p:cNvSpPr>
+          <p:nvPr>
+            <p:ph type="sldNum" sz="quarter" idx="10"/>
+          </p:nvPr>
+        </p:nvSpPr>
+        <p:spPr/>
+        <p:txBody>
+          <a:bodyPr/>
+          <a:lstStyle/>
+          <a:p>
+            <a:fld id="{A4F71BA7-982C-5744-B28F-8EF9F6462FED}" type="slidenum">
+              <a:rPr lang="en-US" smtClean="0"/>
+              <a:t>30</a:t>
+            </a:fld>
+            <a:endParaRPr lang="en-US"/>
+          </a:p>
+        </p:txBody>
+      </p:sp>
+    </p:spTree>
+    <p:extLst>
+      <p:ext uri="{BB962C8B-B14F-4D97-AF65-F5344CB8AC3E}">
+        <p14:creationId xmlns:p14="http://schemas.microsoft.com/office/powerpoint/2010/main" val="3002713313"/>
+      </p:ext>
+    </p:extLst>
+  </p:cSld>
+  <p:clrMapOvr>
+    <a:masterClrMapping/>
+  </p:clrMapOvr>
+</p:notes>
+</file>
+
+<file path=ppt/notesSlides/notesSlide31.xml><?xml version="1.0" encoding="utf-8"?>
+<p:notes xmlns:a="http://schemas.openxmlformats.org/drawingml/2006/main" xmlns:r="http://schemas.openxmlformats.org/officeDocument/2006/relationships" xmlns:p="http://schemas.openxmlformats.org/presentationml/2006/main">
+  <p:cSld>
+    <p:spTree>
+      <p:nvGrpSpPr>
+        <p:cNvPr id="1" name=""/>
+        <p:cNvGrpSpPr/>
+        <p:nvPr/>
+      </p:nvGrpSpPr>
+      <p:grpSpPr>
+        <a:xfrm>
+          <a:off x="0" y="0"/>
+          <a:ext cx="0" cy="0"/>
+          <a:chOff x="0" y="0"/>
+          <a:chExt cx="0" cy="0"/>
+        </a:xfrm>
+      </p:grpSpPr>
+      <p:sp>
+        <p:nvSpPr>
+          <p:cNvPr id="2" name="Slide Image Placeholder 1"/>
+          <p:cNvSpPr>
+            <a:spLocks noGrp="1" noRot="1" noChangeAspect="1"/>
+          </p:cNvSpPr>
+          <p:nvPr>
+            <p:ph type="sldImg"/>
+          </p:nvPr>
+        </p:nvSpPr>
+        <p:spPr/>
+      </p:sp>
+      <p:sp>
+        <p:nvSpPr>
+          <p:cNvPr id="3" name="Notes Placeholder 2"/>
+          <p:cNvSpPr>
+            <a:spLocks noGrp="1"/>
+          </p:cNvSpPr>
+          <p:nvPr>
+            <p:ph type="body" idx="1"/>
+          </p:nvPr>
+        </p:nvSpPr>
+        <p:spPr/>
+        <p:txBody>
+          <a:bodyPr/>
+          <a:lstStyle/>
+          <a:p>
+            <a:endParaRPr lang="en-US"/>
+          </a:p>
+        </p:txBody>
+      </p:sp>
+      <p:sp>
+        <p:nvSpPr>
+          <p:cNvPr id="4" name="Slide Number Placeholder 3"/>
+          <p:cNvSpPr>
+            <a:spLocks noGrp="1"/>
+          </p:cNvSpPr>
+          <p:nvPr>
+            <p:ph type="sldNum" sz="quarter" idx="10"/>
+          </p:nvPr>
+        </p:nvSpPr>
+        <p:spPr/>
+        <p:txBody>
+          <a:bodyPr/>
+          <a:lstStyle/>
+          <a:p>
+            <a:fld id="{A4F71BA7-982C-5744-B28F-8EF9F6462FED}" type="slidenum">
+              <a:rPr lang="en-US" smtClean="0"/>
+              <a:t>31</a:t>
+            </a:fld>
+            <a:endParaRPr lang="en-US"/>
+          </a:p>
+        </p:txBody>
+      </p:sp>
+    </p:spTree>
+    <p:extLst>
+      <p:ext uri="{BB962C8B-B14F-4D97-AF65-F5344CB8AC3E}">
+        <p14:creationId xmlns:p14="http://schemas.microsoft.com/office/powerpoint/2010/main" val="2131793605"/>
+      </p:ext>
+    </p:extLst>
+  </p:cSld>
+  <p:clrMapOvr>
+    <a:masterClrMapping/>
+  </p:clrMapOvr>
+</p:notes>
+</file>
+
+<file path=ppt/notesSlides/notesSlide32.xml><?xml version="1.0" encoding="utf-8"?>
+<p:notes xmlns:a="http://schemas.openxmlformats.org/drawingml/2006/main" xmlns:r="http://schemas.openxmlformats.org/officeDocument/2006/relationships" xmlns:p="http://schemas.openxmlformats.org/presentationml/2006/main">
+  <p:cSld>
+    <p:spTree>
+      <p:nvGrpSpPr>
+        <p:cNvPr id="1" name=""/>
+        <p:cNvGrpSpPr/>
+        <p:nvPr/>
+      </p:nvGrpSpPr>
+      <p:grpSpPr>
+        <a:xfrm>
+          <a:off x="0" y="0"/>
+          <a:ext cx="0" cy="0"/>
+          <a:chOff x="0" y="0"/>
+          <a:chExt cx="0" cy="0"/>
+        </a:xfrm>
+      </p:grpSpPr>
+      <p:sp>
+        <p:nvSpPr>
+          <p:cNvPr id="2" name="Slide Image Placeholder 1"/>
+          <p:cNvSpPr>
+            <a:spLocks noGrp="1" noRot="1" noChangeAspect="1"/>
+          </p:cNvSpPr>
+          <p:nvPr>
+            <p:ph type="sldImg"/>
+          </p:nvPr>
+        </p:nvSpPr>
+        <p:spPr/>
+      </p:sp>
+      <p:sp>
+        <p:nvSpPr>
+          <p:cNvPr id="3" name="Notes Placeholder 2"/>
+          <p:cNvSpPr>
+            <a:spLocks noGrp="1"/>
+          </p:cNvSpPr>
+          <p:nvPr>
+            <p:ph type="body" idx="1"/>
+          </p:nvPr>
+        </p:nvSpPr>
+        <p:spPr/>
+        <p:txBody>
+          <a:bodyPr/>
+          <a:lstStyle/>
+          <a:p>
+            <a:endParaRPr lang="en-US"/>
+          </a:p>
+        </p:txBody>
+      </p:sp>
+      <p:sp>
+        <p:nvSpPr>
+          <p:cNvPr id="4" name="Slide Number Placeholder 3"/>
+          <p:cNvSpPr>
+            <a:spLocks noGrp="1"/>
+          </p:cNvSpPr>
+          <p:nvPr>
+            <p:ph type="sldNum" sz="quarter" idx="10"/>
+          </p:nvPr>
+        </p:nvSpPr>
+        <p:spPr/>
+        <p:txBody>
+          <a:bodyPr/>
+          <a:lstStyle/>
+          <a:p>
+            <a:fld id="{A4F71BA7-982C-5744-B28F-8EF9F6462FED}" type="slidenum">
+              <a:rPr lang="en-US" smtClean="0"/>
+              <a:t>32</a:t>
+            </a:fld>
+            <a:endParaRPr lang="en-US"/>
+          </a:p>
+        </p:txBody>
+      </p:sp>
+    </p:spTree>
+    <p:extLst>
+      <p:ext uri="{BB962C8B-B14F-4D97-AF65-F5344CB8AC3E}">
+        <p14:creationId xmlns:p14="http://schemas.microsoft.com/office/powerpoint/2010/main" val="126940262"/>
+      </p:ext>
+    </p:extLst>
+  </p:cSld>
+  <p:clrMapOvr>
+    <a:masterClrMapping/>
+  </p:clrMapOvr>
+</p:notes>
+</file>
+
+<file path=ppt/notesSlides/notesSlide33.xml><?xml version="1.0" encoding="utf-8"?>
+<p:notes xmlns:a="http://schemas.openxmlformats.org/drawingml/2006/main" xmlns:r="http://schemas.openxmlformats.org/officeDocument/2006/relationships" xmlns:p="http://schemas.openxmlformats.org/presentationml/2006/main">
+  <p:cSld>
+    <p:spTree>
+      <p:nvGrpSpPr>
+        <p:cNvPr id="1" name=""/>
+        <p:cNvGrpSpPr/>
+        <p:nvPr/>
+      </p:nvGrpSpPr>
+      <p:grpSpPr>
+        <a:xfrm>
+          <a:off x="0" y="0"/>
+          <a:ext cx="0" cy="0"/>
+          <a:chOff x="0" y="0"/>
+          <a:chExt cx="0" cy="0"/>
+        </a:xfrm>
+      </p:grpSpPr>
+      <p:sp>
+        <p:nvSpPr>
+          <p:cNvPr id="2" name="Slide Image Placeholder 1"/>
+          <p:cNvSpPr>
+            <a:spLocks noGrp="1" noRot="1" noChangeAspect="1"/>
+          </p:cNvSpPr>
+          <p:nvPr>
+            <p:ph type="sldImg"/>
+          </p:nvPr>
+        </p:nvSpPr>
+        <p:spPr/>
+      </p:sp>
+      <p:sp>
+        <p:nvSpPr>
+          <p:cNvPr id="3" name="Notes Placeholder 2"/>
+          <p:cNvSpPr>
+            <a:spLocks noGrp="1"/>
+          </p:cNvSpPr>
+          <p:nvPr>
+            <p:ph type="body" idx="1"/>
+          </p:nvPr>
+        </p:nvSpPr>
+        <p:spPr/>
+        <p:txBody>
+          <a:bodyPr/>
+          <a:lstStyle/>
+          <a:p>
+            <a:endParaRPr lang="en-US"/>
+          </a:p>
+        </p:txBody>
+      </p:sp>
+      <p:sp>
+        <p:nvSpPr>
+          <p:cNvPr id="4" name="Slide Number Placeholder 3"/>
+          <p:cNvSpPr>
+            <a:spLocks noGrp="1"/>
+          </p:cNvSpPr>
+          <p:nvPr>
+            <p:ph type="sldNum" sz="quarter" idx="10"/>
+          </p:nvPr>
+        </p:nvSpPr>
+        <p:spPr/>
+        <p:txBody>
+          <a:bodyPr/>
+          <a:lstStyle/>
+          <a:p>
+            <a:fld id="{A4F71BA7-982C-5744-B28F-8EF9F6462FED}" type="slidenum">
+              <a:rPr lang="en-US" smtClean="0"/>
+              <a:t>33</a:t>
+            </a:fld>
+            <a:endParaRPr lang="en-US"/>
+          </a:p>
+        </p:txBody>
+      </p:sp>
+    </p:spTree>
+    <p:extLst>
+      <p:ext uri="{BB962C8B-B14F-4D97-AF65-F5344CB8AC3E}">
+        <p14:creationId xmlns:p14="http://schemas.microsoft.com/office/powerpoint/2010/main" val="897608175"/>
+      </p:ext>
+    </p:extLst>
+  </p:cSld>
+  <p:clrMapOvr>
+    <a:masterClrMapping/>
+  </p:clrMapOvr>
+</p:notes>
+</file>
+
+<file path=ppt/notesSlides/notesSlide34.xml><?xml version="1.0" encoding="utf-8"?>
+<p:notes xmlns:a="http://schemas.openxmlformats.org/drawingml/2006/main" xmlns:r="http://schemas.openxmlformats.org/officeDocument/2006/relationships" xmlns:p="http://schemas.openxmlformats.org/presentationml/2006/main">
+  <p:cSld>
+    <p:spTree>
+      <p:nvGrpSpPr>
+        <p:cNvPr id="1" name=""/>
+        <p:cNvGrpSpPr/>
+        <p:nvPr/>
+      </p:nvGrpSpPr>
+      <p:grpSpPr>
+        <a:xfrm>
+          <a:off x="0" y="0"/>
+          <a:ext cx="0" cy="0"/>
+          <a:chOff x="0" y="0"/>
+          <a:chExt cx="0" cy="0"/>
+        </a:xfrm>
+      </p:grpSpPr>
+      <p:sp>
+        <p:nvSpPr>
+          <p:cNvPr id="2" name="Slide Image Placeholder 1"/>
+          <p:cNvSpPr>
+            <a:spLocks noGrp="1" noRot="1" noChangeAspect="1"/>
+          </p:cNvSpPr>
+          <p:nvPr>
+            <p:ph type="sldImg"/>
+          </p:nvPr>
+        </p:nvSpPr>
+        <p:spPr/>
+      </p:sp>
+      <p:sp>
+        <p:nvSpPr>
+          <p:cNvPr id="3" name="Notes Placeholder 2"/>
+          <p:cNvSpPr>
+            <a:spLocks noGrp="1"/>
+          </p:cNvSpPr>
+          <p:nvPr>
+            <p:ph type="body" idx="1"/>
+          </p:nvPr>
+        </p:nvSpPr>
+        <p:spPr/>
+        <p:txBody>
+          <a:bodyPr/>
+          <a:lstStyle/>
+          <a:p>
+            <a:endParaRPr lang="en-US"/>
+          </a:p>
+        </p:txBody>
+      </p:sp>
+      <p:sp>
+        <p:nvSpPr>
+          <p:cNvPr id="4" name="Slide Number Placeholder 3"/>
+          <p:cNvSpPr>
+            <a:spLocks noGrp="1"/>
+          </p:cNvSpPr>
+          <p:nvPr>
+            <p:ph type="sldNum" sz="quarter" idx="10"/>
+          </p:nvPr>
+        </p:nvSpPr>
+        <p:spPr/>
+        <p:txBody>
+          <a:bodyPr/>
+          <a:lstStyle/>
+          <a:p>
+            <a:fld id="{A4F71BA7-982C-5744-B28F-8EF9F6462FED}" type="slidenum">
+              <a:rPr lang="en-US" smtClean="0"/>
+              <a:t>34</a:t>
+            </a:fld>
+            <a:endParaRPr lang="en-US"/>
+          </a:p>
+        </p:txBody>
+      </p:sp>
+    </p:spTree>
+    <p:extLst>
+      <p:ext uri="{BB962C8B-B14F-4D97-AF65-F5344CB8AC3E}">
+        <p14:creationId xmlns:p14="http://schemas.microsoft.com/office/powerpoint/2010/main" val="3940688331"/>
+      </p:ext>
+    </p:extLst>
+  </p:cSld>
+  <p:clrMapOvr>
+    <a:masterClrMapping/>
+  </p:clrMapOvr>
+</p:notes>
+</file>
+
+<file path=ppt/notesSlides/notesSlide35.xml><?xml version="1.0" encoding="utf-8"?>
+<p:notes xmlns:a="http://schemas.openxmlformats.org/drawingml/2006/main" xmlns:r="http://schemas.openxmlformats.org/officeDocument/2006/relationships" xmlns:p="http://schemas.openxmlformats.org/presentationml/2006/main">
+  <p:cSld>
+    <p:spTree>
+      <p:nvGrpSpPr>
+        <p:cNvPr id="1" name=""/>
+        <p:cNvGrpSpPr/>
+        <p:nvPr/>
+      </p:nvGrpSpPr>
+      <p:grpSpPr>
+        <a:xfrm>
+          <a:off x="0" y="0"/>
+          <a:ext cx="0" cy="0"/>
+          <a:chOff x="0" y="0"/>
+          <a:chExt cx="0" cy="0"/>
+        </a:xfrm>
+      </p:grpSpPr>
+      <p:sp>
+        <p:nvSpPr>
+          <p:cNvPr id="2" name="Slide Image Placeholder 1"/>
+          <p:cNvSpPr>
+            <a:spLocks noGrp="1" noRot="1" noChangeAspect="1"/>
+          </p:cNvSpPr>
+          <p:nvPr>
+            <p:ph type="sldImg"/>
+          </p:nvPr>
+        </p:nvSpPr>
+        <p:spPr/>
+      </p:sp>
+      <p:sp>
+        <p:nvSpPr>
+          <p:cNvPr id="3" name="Notes Placeholder 2"/>
+          <p:cNvSpPr>
+            <a:spLocks noGrp="1"/>
+          </p:cNvSpPr>
+          <p:nvPr>
+            <p:ph type="body" idx="1"/>
+          </p:nvPr>
+        </p:nvSpPr>
+        <p:spPr/>
+        <p:txBody>
+          <a:bodyPr/>
+          <a:lstStyle/>
+          <a:p>
+            <a:endParaRPr lang="en-US"/>
+          </a:p>
+        </p:txBody>
+      </p:sp>
+      <p:sp>
+        <p:nvSpPr>
+          <p:cNvPr id="4" name="Slide Number Placeholder 3"/>
+          <p:cNvSpPr>
+            <a:spLocks noGrp="1"/>
+          </p:cNvSpPr>
+          <p:nvPr>
+            <p:ph type="sldNum" sz="quarter" idx="10"/>
+          </p:nvPr>
+        </p:nvSpPr>
+        <p:spPr/>
+        <p:txBody>
+          <a:bodyPr/>
+          <a:lstStyle/>
+          <a:p>
+            <a:fld id="{A4F71BA7-982C-5744-B28F-8EF9F6462FED}" type="slidenum">
+              <a:rPr lang="en-US" smtClean="0"/>
+              <a:t>35</a:t>
+            </a:fld>
+            <a:endParaRPr lang="en-US"/>
+          </a:p>
+        </p:txBody>
+      </p:sp>
+    </p:spTree>
+    <p:extLst>
+      <p:ext uri="{BB962C8B-B14F-4D97-AF65-F5344CB8AC3E}">
+        <p14:creationId xmlns:p14="http://schemas.microsoft.com/office/powerpoint/2010/main" val="1590811909"/>
       </p:ext>
     </p:extLst>
   </p:cSld>
@@ -2900,7 +3824,7 @@
             <a:fld id="{E637BB6B-EE1B-48FB-8575-0D55C373DE88}" type="datetimeFigureOut">
               <a:rPr lang="en-US" smtClean="0"/>
               <a:pPr eaLnBrk="1" latinLnBrk="0" hangingPunct="1"/>
-              <a:t>1/9/15</a:t>
+              <a:t>1/13/15</a:t>
             </a:fld>
             <a:endParaRPr lang="en-US"/>
           </a:p>
@@ -3068,7 +3992,7 @@
             <a:fld id="{E637BB6B-EE1B-48FB-8575-0D55C373DE88}" type="datetimeFigureOut">
               <a:rPr lang="en-US" smtClean="0"/>
               <a:pPr eaLnBrk="1" latinLnBrk="0" hangingPunct="1"/>
-              <a:t>1/9/15</a:t>
+              <a:t>1/13/15</a:t>
             </a:fld>
             <a:endParaRPr lang="en-US" dirty="0"/>
           </a:p>
@@ -3246,7 +4170,7 @@
             <a:fld id="{E637BB6B-EE1B-48FB-8575-0D55C373DE88}" type="datetimeFigureOut">
               <a:rPr lang="en-US" smtClean="0"/>
               <a:pPr eaLnBrk="1" latinLnBrk="0" hangingPunct="1"/>
-              <a:t>1/9/15</a:t>
+              <a:t>1/13/15</a:t>
             </a:fld>
             <a:endParaRPr lang="en-US"/>
           </a:p>
@@ -3418,7 +4342,7 @@
             <a:fld id="{E637BB6B-EE1B-48FB-8575-0D55C373DE88}" type="datetimeFigureOut">
               <a:rPr lang="en-US" smtClean="0"/>
               <a:pPr eaLnBrk="1" latinLnBrk="0" hangingPunct="1"/>
-              <a:t>1/9/15</a:t>
+              <a:t>1/13/15</a:t>
             </a:fld>
             <a:endParaRPr lang="en-US"/>
           </a:p>
@@ -3876,7 +4800,7 @@
             <a:fld id="{E637BB6B-EE1B-48FB-8575-0D55C373DE88}" type="datetimeFigureOut">
               <a:rPr lang="en-US" smtClean="0"/>
               <a:pPr eaLnBrk="1" latinLnBrk="0" hangingPunct="1"/>
-              <a:t>1/9/15</a:t>
+              <a:t>1/13/15</a:t>
             </a:fld>
             <a:endParaRPr lang="en-US"/>
           </a:p>
@@ -4143,7 +5067,7 @@
             <a:fld id="{E637BB6B-EE1B-48FB-8575-0D55C373DE88}" type="datetimeFigureOut">
               <a:rPr lang="en-US" smtClean="0"/>
               <a:pPr eaLnBrk="1" latinLnBrk="0" hangingPunct="1"/>
-              <a:t>1/9/15</a:t>
+              <a:t>1/13/15</a:t>
             </a:fld>
             <a:endParaRPr lang="en-US"/>
           </a:p>
@@ -4520,7 +5444,7 @@
             <a:fld id="{E637BB6B-EE1B-48FB-8575-0D55C373DE88}" type="datetimeFigureOut">
               <a:rPr lang="en-US" smtClean="0"/>
               <a:pPr eaLnBrk="1" latinLnBrk="0" hangingPunct="1"/>
-              <a:t>1/9/15</a:t>
+              <a:t>1/13/15</a:t>
             </a:fld>
             <a:endParaRPr lang="en-US"/>
           </a:p>
@@ -4645,7 +5569,7 @@
             <a:fld id="{E637BB6B-EE1B-48FB-8575-0D55C373DE88}" type="datetimeFigureOut">
               <a:rPr lang="en-US" smtClean="0"/>
               <a:pPr eaLnBrk="1" latinLnBrk="0" hangingPunct="1"/>
-              <a:t>1/9/15</a:t>
+              <a:t>1/13/15</a:t>
             </a:fld>
             <a:endParaRPr lang="en-US"/>
           </a:p>
@@ -4738,7 +5662,7 @@
             <a:fld id="{E637BB6B-EE1B-48FB-8575-0D55C373DE88}" type="datetimeFigureOut">
               <a:rPr lang="en-US" smtClean="0"/>
               <a:pPr eaLnBrk="1" latinLnBrk="0" hangingPunct="1"/>
-              <a:t>1/9/15</a:t>
+              <a:t>1/13/15</a:t>
             </a:fld>
             <a:endParaRPr lang="en-US"/>
           </a:p>
@@ -4990,7 +5914,7 @@
             <a:fld id="{E637BB6B-EE1B-48FB-8575-0D55C373DE88}" type="datetimeFigureOut">
               <a:rPr lang="en-US" smtClean="0"/>
               <a:pPr eaLnBrk="1" latinLnBrk="0" hangingPunct="1"/>
-              <a:t>1/9/15</a:t>
+              <a:t>1/13/15</a:t>
             </a:fld>
             <a:endParaRPr lang="en-US"/>
           </a:p>
@@ -5252,7 +6176,7 @@
             <a:fld id="{E637BB6B-EE1B-48FB-8575-0D55C373DE88}" type="datetimeFigureOut">
               <a:rPr lang="en-US" smtClean="0"/>
               <a:pPr eaLnBrk="1" latinLnBrk="0" hangingPunct="1"/>
-              <a:t>1/9/15</a:t>
+              <a:t>1/13/15</a:t>
             </a:fld>
             <a:endParaRPr lang="en-US"/>
           </a:p>
@@ -5659,7 +6583,7 @@
             <a:fld id="{E637BB6B-EE1B-48FB-8575-0D55C373DE88}" type="datetimeFigureOut">
               <a:rPr lang="en-US" smtClean="0"/>
               <a:pPr eaLnBrk="1" latinLnBrk="0" hangingPunct="1"/>
-              <a:t>1/9/15</a:t>
+              <a:t>1/13/15</a:t>
             </a:fld>
             <a:endParaRPr lang="en-US" sz="1000">
               <a:solidFill>
@@ -6096,7 +7020,25 @@
           <a:p>
             <a:r>
               <a:rPr lang="en-US" dirty="0" smtClean="0"/>
-              <a:t>CSE10101 </a:t>
+              <a:t>CSE10101</a:t>
+            </a:r>
+            <a:br>
+              <a:rPr lang="en-US" dirty="0" smtClean="0"/>
+            </a:br>
+            <a:r>
+              <a:rPr lang="en-US" dirty="0" smtClean="0"/>
+              <a:t>aka</a:t>
+            </a:r>
+            <a:br>
+              <a:rPr lang="en-US" dirty="0" smtClean="0"/>
+            </a:br>
+            <a:r>
+              <a:rPr lang="en-US" dirty="0" smtClean="0"/>
+              <a:t>CAPP30391</a:t>
+            </a:r>
+            <a:r>
+              <a:rPr lang="en-US" dirty="0" smtClean="0"/>
+              <a:t> </a:t>
             </a:r>
             <a:endParaRPr lang="en-US" dirty="0"/>
           </a:p>
@@ -6976,12 +7918,34 @@
         </p:nvSpPr>
         <p:spPr/>
         <p:txBody>
-          <a:bodyPr/>
+          <a:bodyPr>
+            <a:normAutofit fontScale="90000"/>
+          </a:bodyPr>
           <a:lstStyle/>
           <a:p>
             <a:r>
               <a:rPr lang="en-US" dirty="0" smtClean="0"/>
-              <a:t>1/13: Feast day of St. Hilary, patron against snake bites</a:t>
+              <a:t>1/13: Feast day of St. Hilary, </a:t>
+            </a:r>
+            <a:r>
+              <a:rPr lang="en-US" dirty="0" smtClean="0"/>
+              <a:t>Doctor of the Church </a:t>
+            </a:r>
+            <a:r>
+              <a:rPr lang="en-US" smtClean="0"/>
+              <a:t>(and patron </a:t>
+            </a:r>
+            <a:r>
+              <a:rPr lang="en-US" dirty="0" smtClean="0"/>
+              <a:t>against </a:t>
+            </a:r>
+            <a:r>
+              <a:rPr lang="en-US" smtClean="0"/>
+              <a:t>snake </a:t>
+            </a:r>
+            <a:r>
+              <a:rPr lang="en-US" smtClean="0"/>
+              <a:t>bites)</a:t>
             </a:r>
             <a:endParaRPr lang="en-US" dirty="0"/>
           </a:p>
@@ -8729,6 +9693,13 @@
   <p:clrMapOvr>
     <a:masterClrMapping/>
   </p:clrMapOvr>
+  <p:timing>
+    <p:tnLst>
+      <p:par>
+        <p:cTn xmlns:p14="http://schemas.microsoft.com/office/powerpoint/2010/main" id="1" dur="indefinite" restart="never" nodeType="tmRoot"/>
+      </p:par>
+    </p:tnLst>
+  </p:timing>
 </p:sld>
 </file>
 

</xml_diff>